<commit_message>
update last changes notif-envelope
</commit_message>
<xml_diff>
--- a/124/NETCONF/draft-ietf-netconf-notif-envelope-03.pptx
+++ b/124/NETCONF/draft-ietf-netconf-notif-envelope-03.pptx
@@ -1809,7 +1809,7 @@
   <p:cSld>
     <p:spTree>
       <p:nvGrpSpPr>
-        <p:cNvPr id="173" name="Shape 173"/>
+        <p:cNvPr id="175" name="Shape 175"/>
         <p:cNvGrpSpPr/>
         <p:nvPr/>
       </p:nvGrpSpPr>
@@ -1823,7 +1823,7 @@
       </p:grpSpPr>
       <p:sp>
         <p:nvSpPr>
-          <p:cNvPr id="174" name="Google Shape;174;g32d7ec59dd8_0_4:notes"/>
+          <p:cNvPr id="176" name="Google Shape;176;g32d7ec59dd8_0_4:notes"/>
           <p:cNvSpPr txBox="1"/>
           <p:nvPr>
             <p:ph idx="1" type="body"/>
@@ -1870,7 +1870,7 @@
       </p:sp>
       <p:sp>
         <p:nvSpPr>
-          <p:cNvPr id="175" name="Google Shape;175;g32d7ec59dd8_0_4:notes"/>
+          <p:cNvPr id="177" name="Google Shape;177;g32d7ec59dd8_0_4:notes"/>
           <p:cNvSpPr/>
           <p:nvPr>
             <p:ph idx="2" type="sldImg"/>
@@ -1926,7 +1926,7 @@
   <p:cSld>
     <p:spTree>
       <p:nvGrpSpPr>
-        <p:cNvPr id="182" name="Shape 182"/>
+        <p:cNvPr id="184" name="Shape 184"/>
         <p:cNvGrpSpPr/>
         <p:nvPr/>
       </p:nvGrpSpPr>
@@ -1940,7 +1940,7 @@
       </p:grpSpPr>
       <p:sp>
         <p:nvSpPr>
-          <p:cNvPr id="183" name="Google Shape;183;g237ce9b2c9c_0_11:notes"/>
+          <p:cNvPr id="185" name="Google Shape;185;g237ce9b2c9c_0_11:notes"/>
           <p:cNvSpPr txBox="1"/>
           <p:nvPr>
             <p:ph idx="1" type="body"/>
@@ -1987,7 +1987,7 @@
       </p:sp>
       <p:sp>
         <p:nvSpPr>
-          <p:cNvPr id="184" name="Google Shape;184;g237ce9b2c9c_0_11:notes"/>
+          <p:cNvPr id="186" name="Google Shape;186;g237ce9b2c9c_0_11:notes"/>
           <p:cNvSpPr/>
           <p:nvPr>
             <p:ph idx="2" type="sldImg"/>
@@ -2043,7 +2043,7 @@
   <p:cSld>
     <p:spTree>
       <p:nvGrpSpPr>
-        <p:cNvPr id="189" name="Shape 189"/>
+        <p:cNvPr id="191" name="Shape 191"/>
         <p:cNvGrpSpPr/>
         <p:nvPr/>
       </p:nvGrpSpPr>
@@ -2057,7 +2057,7 @@
       </p:grpSpPr>
       <p:sp>
         <p:nvSpPr>
-          <p:cNvPr id="190" name="Google Shape;190;g30de21959b9_0_13:notes"/>
+          <p:cNvPr id="192" name="Google Shape;192;g30de21959b9_0_13:notes"/>
           <p:cNvSpPr txBox="1"/>
           <p:nvPr>
             <p:ph idx="1" type="body"/>
@@ -2104,7 +2104,7 @@
       </p:sp>
       <p:sp>
         <p:nvSpPr>
-          <p:cNvPr id="191" name="Google Shape;191;g30de21959b9_0_13:notes"/>
+          <p:cNvPr id="193" name="Google Shape;193;g30de21959b9_0_13:notes"/>
           <p:cNvSpPr/>
           <p:nvPr>
             <p:ph idx="2" type="sldImg"/>
@@ -2160,7 +2160,7 @@
   <p:cSld>
     <p:spTree>
       <p:nvGrpSpPr>
-        <p:cNvPr id="212" name="Shape 212"/>
+        <p:cNvPr id="214" name="Shape 214"/>
         <p:cNvGrpSpPr/>
         <p:nvPr/>
       </p:nvGrpSpPr>
@@ -2174,7 +2174,7 @@
       </p:grpSpPr>
       <p:sp>
         <p:nvSpPr>
-          <p:cNvPr id="213" name="Google Shape;213;g30de21959b9_0_46:notes"/>
+          <p:cNvPr id="215" name="Google Shape;215;g30de21959b9_0_46:notes"/>
           <p:cNvSpPr txBox="1"/>
           <p:nvPr>
             <p:ph idx="1" type="body"/>
@@ -2221,7 +2221,7 @@
       </p:sp>
       <p:sp>
         <p:nvSpPr>
-          <p:cNvPr id="214" name="Google Shape;214;g30de21959b9_0_46:notes"/>
+          <p:cNvPr id="216" name="Google Shape;216;g30de21959b9_0_46:notes"/>
           <p:cNvSpPr/>
           <p:nvPr>
             <p:ph idx="2" type="sldImg"/>
@@ -2277,7 +2277,7 @@
   <p:cSld>
     <p:spTree>
       <p:nvGrpSpPr>
-        <p:cNvPr id="229" name="Shape 229"/>
+        <p:cNvPr id="231" name="Shape 231"/>
         <p:cNvGrpSpPr/>
         <p:nvPr/>
       </p:nvGrpSpPr>
@@ -2291,7 +2291,7 @@
       </p:grpSpPr>
       <p:sp>
         <p:nvSpPr>
-          <p:cNvPr id="230" name="Google Shape;230;g30de21959b9_0_73:notes"/>
+          <p:cNvPr id="232" name="Google Shape;232;g30de21959b9_0_73:notes"/>
           <p:cNvSpPr txBox="1"/>
           <p:nvPr>
             <p:ph idx="1" type="body"/>
@@ -2338,7 +2338,7 @@
       </p:sp>
       <p:sp>
         <p:nvSpPr>
-          <p:cNvPr id="231" name="Google Shape;231;g30de21959b9_0_73:notes"/>
+          <p:cNvPr id="233" name="Google Shape;233;g30de21959b9_0_73:notes"/>
           <p:cNvSpPr/>
           <p:nvPr>
             <p:ph idx="2" type="sldImg"/>
@@ -2394,7 +2394,7 @@
   <p:cSld>
     <p:spTree>
       <p:nvGrpSpPr>
-        <p:cNvPr id="254" name="Shape 254"/>
+        <p:cNvPr id="256" name="Shape 256"/>
         <p:cNvGrpSpPr/>
         <p:nvPr/>
       </p:nvGrpSpPr>
@@ -2408,7 +2408,7 @@
       </p:grpSpPr>
       <p:sp>
         <p:nvSpPr>
-          <p:cNvPr id="255" name="Google Shape;255;g30de21959b9_0_105:notes"/>
+          <p:cNvPr id="257" name="Google Shape;257;g30de21959b9_0_105:notes"/>
           <p:cNvSpPr txBox="1"/>
           <p:nvPr>
             <p:ph idx="1" type="body"/>
@@ -2455,7 +2455,7 @@
       </p:sp>
       <p:sp>
         <p:nvSpPr>
-          <p:cNvPr id="256" name="Google Shape;256;g30de21959b9_0_105:notes"/>
+          <p:cNvPr id="258" name="Google Shape;258;g30de21959b9_0_105:notes"/>
           <p:cNvSpPr/>
           <p:nvPr>
             <p:ph idx="2" type="sldImg"/>
@@ -2511,7 +2511,7 @@
   <p:cSld>
     <p:spTree>
       <p:nvGrpSpPr>
-        <p:cNvPr id="262" name="Shape 262"/>
+        <p:cNvPr id="264" name="Shape 264"/>
         <p:cNvGrpSpPr/>
         <p:nvPr/>
       </p:nvGrpSpPr>
@@ -2525,7 +2525,7 @@
       </p:grpSpPr>
       <p:sp>
         <p:nvSpPr>
-          <p:cNvPr id="263" name="Google Shape;263;g30de21959b9_0_135:notes"/>
+          <p:cNvPr id="265" name="Google Shape;265;g30de21959b9_0_135:notes"/>
           <p:cNvSpPr txBox="1"/>
           <p:nvPr>
             <p:ph idx="1" type="body"/>
@@ -2572,7 +2572,7 @@
       </p:sp>
       <p:sp>
         <p:nvSpPr>
-          <p:cNvPr id="264" name="Google Shape;264;g30de21959b9_0_135:notes"/>
+          <p:cNvPr id="266" name="Google Shape;266;g30de21959b9_0_135:notes"/>
           <p:cNvSpPr/>
           <p:nvPr>
             <p:ph idx="2" type="sldImg"/>
@@ -3096,7 +3096,7 @@
   <p:cSld>
     <p:spTree>
       <p:nvGrpSpPr>
-        <p:cNvPr id="127" name="Shape 127"/>
+        <p:cNvPr id="129" name="Shape 129"/>
         <p:cNvGrpSpPr/>
         <p:nvPr/>
       </p:nvGrpSpPr>
@@ -3110,7 +3110,7 @@
       </p:grpSpPr>
       <p:sp>
         <p:nvSpPr>
-          <p:cNvPr id="128" name="Google Shape;128;g3862c0add18_0_24:notes"/>
+          <p:cNvPr id="130" name="Google Shape;130;g3862c0add18_0_24:notes"/>
           <p:cNvSpPr txBox="1"/>
           <p:nvPr>
             <p:ph idx="1" type="body"/>
@@ -3157,7 +3157,7 @@
       </p:sp>
       <p:sp>
         <p:nvSpPr>
-          <p:cNvPr id="129" name="Google Shape;129;g3862c0add18_0_24:notes"/>
+          <p:cNvPr id="131" name="Google Shape;131;g3862c0add18_0_24:notes"/>
           <p:cNvSpPr/>
           <p:nvPr>
             <p:ph idx="2" type="sldImg"/>
@@ -3213,7 +3213,7 @@
   <p:cSld>
     <p:spTree>
       <p:nvGrpSpPr>
-        <p:cNvPr id="134" name="Shape 134"/>
+        <p:cNvPr id="136" name="Shape 136"/>
         <p:cNvGrpSpPr/>
         <p:nvPr/>
       </p:nvGrpSpPr>
@@ -3227,7 +3227,7 @@
       </p:grpSpPr>
       <p:sp>
         <p:nvSpPr>
-          <p:cNvPr id="135" name="Google Shape;135;g32d6f77c6d9_0_6:notes"/>
+          <p:cNvPr id="137" name="Google Shape;137;g32d6f77c6d9_0_6:notes"/>
           <p:cNvSpPr/>
           <p:nvPr>
             <p:ph idx="2" type="sldImg"/>
@@ -3262,7 +3262,7 @@
       </p:sp>
       <p:sp>
         <p:nvSpPr>
-          <p:cNvPr id="136" name="Google Shape;136;g32d6f77c6d9_0_6:notes"/>
+          <p:cNvPr id="138" name="Google Shape;138;g32d6f77c6d9_0_6:notes"/>
           <p:cNvSpPr txBox="1"/>
           <p:nvPr>
             <p:ph idx="1" type="body"/>
@@ -3301,7 +3301,7 @@
       </p:sp>
       <p:sp>
         <p:nvSpPr>
-          <p:cNvPr id="137" name="Google Shape;137;g32d6f77c6d9_0_6:notes"/>
+          <p:cNvPr id="139" name="Google Shape;139;g32d6f77c6d9_0_6:notes"/>
           <p:cNvSpPr txBox="1"/>
           <p:nvPr>
             <p:ph idx="12" type="sldNum"/>
@@ -3357,7 +3357,7 @@
   <p:cSld>
     <p:spTree>
       <p:nvGrpSpPr>
-        <p:cNvPr id="141" name="Shape 141"/>
+        <p:cNvPr id="143" name="Shape 143"/>
         <p:cNvGrpSpPr/>
         <p:nvPr/>
       </p:nvGrpSpPr>
@@ -3371,7 +3371,7 @@
       </p:grpSpPr>
       <p:sp>
         <p:nvSpPr>
-          <p:cNvPr id="142" name="Google Shape;142;g32d6f77c6d9_1_10:notes"/>
+          <p:cNvPr id="144" name="Google Shape;144;g32d6f77c6d9_1_10:notes"/>
           <p:cNvSpPr txBox="1"/>
           <p:nvPr>
             <p:ph idx="1" type="body"/>
@@ -3418,7 +3418,7 @@
       </p:sp>
       <p:sp>
         <p:nvSpPr>
-          <p:cNvPr id="143" name="Google Shape;143;g32d6f77c6d9_1_10:notes"/>
+          <p:cNvPr id="145" name="Google Shape;145;g32d6f77c6d9_1_10:notes"/>
           <p:cNvSpPr/>
           <p:nvPr>
             <p:ph idx="2" type="sldImg"/>
@@ -3474,7 +3474,7 @@
   <p:cSld>
     <p:spTree>
       <p:nvGrpSpPr>
-        <p:cNvPr id="166" name="Shape 166"/>
+        <p:cNvPr id="168" name="Shape 168"/>
         <p:cNvGrpSpPr/>
         <p:nvPr/>
       </p:nvGrpSpPr>
@@ -3488,7 +3488,7 @@
       </p:grpSpPr>
       <p:sp>
         <p:nvSpPr>
-          <p:cNvPr id="167" name="Google Shape;167;g32d6f77c6d9_0_37:notes"/>
+          <p:cNvPr id="169" name="Google Shape;169;g32d6f77c6d9_0_37:notes"/>
           <p:cNvSpPr txBox="1"/>
           <p:nvPr>
             <p:ph idx="1" type="body"/>
@@ -3535,7 +3535,7 @@
       </p:sp>
       <p:sp>
         <p:nvSpPr>
-          <p:cNvPr id="168" name="Google Shape;168;g32d6f77c6d9_0_37:notes"/>
+          <p:cNvPr id="170" name="Google Shape;170;g32d6f77c6d9_0_37:notes"/>
           <p:cNvSpPr/>
           <p:nvPr>
             <p:ph idx="2" type="sldImg"/>
@@ -17312,7 +17312,7 @@
   <p:cSld>
     <p:spTree>
       <p:nvGrpSpPr>
-        <p:cNvPr id="176" name="Shape 176"/>
+        <p:cNvPr id="178" name="Shape 178"/>
         <p:cNvGrpSpPr/>
         <p:nvPr/>
       </p:nvGrpSpPr>
@@ -17326,7 +17326,7 @@
       </p:grpSpPr>
       <p:sp>
         <p:nvSpPr>
-          <p:cNvPr id="177" name="Google Shape;177;p22"/>
+          <p:cNvPr id="179" name="Google Shape;179;p22"/>
           <p:cNvSpPr txBox="1"/>
           <p:nvPr>
             <p:ph type="title"/>
@@ -17397,7 +17397,7 @@
       </p:sp>
       <p:sp>
         <p:nvSpPr>
-          <p:cNvPr id="178" name="Google Shape;178;p22"/>
+          <p:cNvPr id="180" name="Google Shape;180;p22"/>
           <p:cNvSpPr txBox="1"/>
           <p:nvPr>
             <p:ph idx="12" type="sldNum"/>
@@ -17445,7 +17445,7 @@
       </p:sp>
       <p:sp>
         <p:nvSpPr>
-          <p:cNvPr id="179" name="Google Shape;179;p22"/>
+          <p:cNvPr id="181" name="Google Shape;181;p22"/>
           <p:cNvSpPr txBox="1"/>
           <p:nvPr/>
         </p:nvSpPr>
@@ -17801,7 +17801,7 @@
       </p:sp>
       <p:pic>
         <p:nvPicPr>
-          <p:cNvPr id="180" name="Google Shape;180;p22"/>
+          <p:cNvPr id="182" name="Google Shape;182;p22"/>
           <p:cNvPicPr preferRelativeResize="0"/>
           <p:nvPr/>
         </p:nvPicPr>
@@ -17829,7 +17829,7 @@
       </p:pic>
       <p:pic>
         <p:nvPicPr>
-          <p:cNvPr id="181" name="Google Shape;181;p22"/>
+          <p:cNvPr id="183" name="Google Shape;183;p22"/>
           <p:cNvPicPr preferRelativeResize="0"/>
           <p:nvPr/>
         </p:nvPicPr>
@@ -17868,7 +17868,7 @@
   <p:cSld>
     <p:spTree>
       <p:nvGrpSpPr>
-        <p:cNvPr id="185" name="Shape 185"/>
+        <p:cNvPr id="187" name="Shape 187"/>
         <p:cNvGrpSpPr/>
         <p:nvPr/>
       </p:nvGrpSpPr>
@@ -17882,7 +17882,7 @@
       </p:grpSpPr>
       <p:sp>
         <p:nvSpPr>
-          <p:cNvPr id="186" name="Google Shape;186;p23"/>
+          <p:cNvPr id="188" name="Google Shape;188;p23"/>
           <p:cNvSpPr txBox="1"/>
           <p:nvPr>
             <p:ph type="title"/>
@@ -17953,7 +17953,7 @@
       </p:sp>
       <p:sp>
         <p:nvSpPr>
-          <p:cNvPr id="187" name="Google Shape;187;p23"/>
+          <p:cNvPr id="189" name="Google Shape;189;p23"/>
           <p:cNvSpPr txBox="1"/>
           <p:nvPr/>
         </p:nvSpPr>
@@ -18546,7 +18546,7 @@
       </p:sp>
       <p:sp>
         <p:nvSpPr>
-          <p:cNvPr id="188" name="Google Shape;188;p23"/>
+          <p:cNvPr id="190" name="Google Shape;190;p23"/>
           <p:cNvSpPr txBox="1"/>
           <p:nvPr>
             <p:ph idx="12" type="sldNum"/>
@@ -18605,7 +18605,7 @@
   <p:cSld>
     <p:spTree>
       <p:nvGrpSpPr>
-        <p:cNvPr id="192" name="Shape 192"/>
+        <p:cNvPr id="194" name="Shape 194"/>
         <p:cNvGrpSpPr/>
         <p:nvPr/>
       </p:nvGrpSpPr>
@@ -18619,7 +18619,7 @@
       </p:grpSpPr>
       <p:sp>
         <p:nvSpPr>
-          <p:cNvPr id="193" name="Google Shape;193;p24"/>
+          <p:cNvPr id="195" name="Google Shape;195;p24"/>
           <p:cNvSpPr txBox="1"/>
           <p:nvPr>
             <p:ph type="title"/>
@@ -18682,7 +18682,7 @@
       </p:sp>
       <p:sp>
         <p:nvSpPr>
-          <p:cNvPr id="194" name="Google Shape;194;p24"/>
+          <p:cNvPr id="196" name="Google Shape;196;p24"/>
           <p:cNvSpPr txBox="1"/>
           <p:nvPr/>
         </p:nvSpPr>
@@ -18744,7 +18744,7 @@
       </p:sp>
       <p:sp>
         <p:nvSpPr>
-          <p:cNvPr id="195" name="Google Shape;195;p24"/>
+          <p:cNvPr id="197" name="Google Shape;197;p24"/>
           <p:cNvSpPr txBox="1"/>
           <p:nvPr>
             <p:ph idx="12" type="sldNum"/>
@@ -18792,7 +18792,7 @@
       </p:sp>
       <p:pic>
         <p:nvPicPr>
-          <p:cNvPr id="196" name="Google Shape;196;p24"/>
+          <p:cNvPr id="198" name="Google Shape;198;p24"/>
           <p:cNvPicPr preferRelativeResize="0"/>
           <p:nvPr/>
         </p:nvPicPr>
@@ -18820,7 +18820,7 @@
       </p:pic>
       <p:sp>
         <p:nvSpPr>
-          <p:cNvPr id="197" name="Google Shape;197;p24"/>
+          <p:cNvPr id="199" name="Google Shape;199;p24"/>
           <p:cNvSpPr/>
           <p:nvPr/>
         </p:nvSpPr>
@@ -18870,7 +18870,7 @@
       </p:sp>
       <p:pic>
         <p:nvPicPr>
-          <p:cNvPr id="198" name="Google Shape;198;p24"/>
+          <p:cNvPr id="200" name="Google Shape;200;p24"/>
           <p:cNvPicPr preferRelativeResize="0"/>
           <p:nvPr/>
         </p:nvPicPr>
@@ -18898,7 +18898,7 @@
       </p:pic>
       <p:cxnSp>
         <p:nvCxnSpPr>
-          <p:cNvPr id="199" name="Google Shape;199;p24"/>
+          <p:cNvPr id="201" name="Google Shape;201;p24"/>
           <p:cNvCxnSpPr/>
           <p:nvPr/>
         </p:nvCxnSpPr>
@@ -18924,7 +18924,7 @@
       </p:cxnSp>
       <p:sp>
         <p:nvSpPr>
-          <p:cNvPr id="200" name="Google Shape;200;p24"/>
+          <p:cNvPr id="202" name="Google Shape;202;p24"/>
           <p:cNvSpPr txBox="1"/>
           <p:nvPr/>
         </p:nvSpPr>
@@ -18966,7 +18966,7 @@
       </p:sp>
       <p:cxnSp>
         <p:nvCxnSpPr>
-          <p:cNvPr id="201" name="Google Shape;201;p24"/>
+          <p:cNvPr id="203" name="Google Shape;203;p24"/>
           <p:cNvCxnSpPr/>
           <p:nvPr/>
         </p:nvCxnSpPr>
@@ -18992,7 +18992,7 @@
       </p:cxnSp>
       <p:sp>
         <p:nvSpPr>
-          <p:cNvPr id="202" name="Google Shape;202;p24"/>
+          <p:cNvPr id="204" name="Google Shape;204;p24"/>
           <p:cNvSpPr txBox="1"/>
           <p:nvPr/>
         </p:nvSpPr>
@@ -19034,7 +19034,7 @@
       </p:sp>
       <p:pic>
         <p:nvPicPr>
-          <p:cNvPr id="203" name="Google Shape;203;p24"/>
+          <p:cNvPr id="205" name="Google Shape;205;p24"/>
           <p:cNvPicPr preferRelativeResize="0"/>
           <p:nvPr/>
         </p:nvPicPr>
@@ -19062,7 +19062,7 @@
       </p:pic>
       <p:sp>
         <p:nvSpPr>
-          <p:cNvPr id="204" name="Google Shape;204;p24"/>
+          <p:cNvPr id="206" name="Google Shape;206;p24"/>
           <p:cNvSpPr/>
           <p:nvPr/>
         </p:nvSpPr>
@@ -19112,7 +19112,7 @@
       </p:sp>
       <p:pic>
         <p:nvPicPr>
-          <p:cNvPr id="205" name="Google Shape;205;p24"/>
+          <p:cNvPr id="207" name="Google Shape;207;p24"/>
           <p:cNvPicPr preferRelativeResize="0"/>
           <p:nvPr/>
         </p:nvPicPr>
@@ -19140,7 +19140,7 @@
       </p:pic>
       <p:cxnSp>
         <p:nvCxnSpPr>
-          <p:cNvPr id="206" name="Google Shape;206;p24"/>
+          <p:cNvPr id="208" name="Google Shape;208;p24"/>
           <p:cNvCxnSpPr/>
           <p:nvPr/>
         </p:nvCxnSpPr>
@@ -19166,7 +19166,7 @@
       </p:cxnSp>
       <p:sp>
         <p:nvSpPr>
-          <p:cNvPr id="207" name="Google Shape;207;p24"/>
+          <p:cNvPr id="209" name="Google Shape;209;p24"/>
           <p:cNvSpPr txBox="1"/>
           <p:nvPr/>
         </p:nvSpPr>
@@ -19208,7 +19208,7 @@
       </p:sp>
       <p:cxnSp>
         <p:nvCxnSpPr>
-          <p:cNvPr id="208" name="Google Shape;208;p24"/>
+          <p:cNvPr id="210" name="Google Shape;210;p24"/>
           <p:cNvCxnSpPr/>
           <p:nvPr/>
         </p:nvCxnSpPr>
@@ -19234,7 +19234,7 @@
       </p:cxnSp>
       <p:sp>
         <p:nvSpPr>
-          <p:cNvPr id="209" name="Google Shape;209;p24"/>
+          <p:cNvPr id="211" name="Google Shape;211;p24"/>
           <p:cNvSpPr txBox="1"/>
           <p:nvPr/>
         </p:nvSpPr>
@@ -19280,7 +19280,7 @@
       </p:sp>
       <p:sp>
         <p:nvSpPr>
-          <p:cNvPr id="210" name="Google Shape;210;p24"/>
+          <p:cNvPr id="212" name="Google Shape;212;p24"/>
           <p:cNvSpPr txBox="1"/>
           <p:nvPr/>
         </p:nvSpPr>
@@ -19370,7 +19370,7 @@
       </p:sp>
       <p:pic>
         <p:nvPicPr>
-          <p:cNvPr id="211" name="Google Shape;211;p24"/>
+          <p:cNvPr id="213" name="Google Shape;213;p24"/>
           <p:cNvPicPr preferRelativeResize="0"/>
           <p:nvPr/>
         </p:nvPicPr>
@@ -19409,7 +19409,7 @@
   <p:cSld>
     <p:spTree>
       <p:nvGrpSpPr>
-        <p:cNvPr id="215" name="Shape 215"/>
+        <p:cNvPr id="217" name="Shape 217"/>
         <p:cNvGrpSpPr/>
         <p:nvPr/>
       </p:nvGrpSpPr>
@@ -19423,7 +19423,7 @@
       </p:grpSpPr>
       <p:sp>
         <p:nvSpPr>
-          <p:cNvPr id="216" name="Google Shape;216;p25"/>
+          <p:cNvPr id="218" name="Google Shape;218;p25"/>
           <p:cNvSpPr txBox="1"/>
           <p:nvPr>
             <p:ph type="title"/>
@@ -19486,7 +19486,7 @@
       </p:sp>
       <p:sp>
         <p:nvSpPr>
-          <p:cNvPr id="217" name="Google Shape;217;p25"/>
+          <p:cNvPr id="219" name="Google Shape;219;p25"/>
           <p:cNvSpPr txBox="1"/>
           <p:nvPr/>
         </p:nvSpPr>
@@ -19570,7 +19570,7 @@
       </p:sp>
       <p:sp>
         <p:nvSpPr>
-          <p:cNvPr id="218" name="Google Shape;218;p25"/>
+          <p:cNvPr id="220" name="Google Shape;220;p25"/>
           <p:cNvSpPr txBox="1"/>
           <p:nvPr>
             <p:ph idx="12" type="sldNum"/>
@@ -19618,7 +19618,7 @@
       </p:sp>
       <p:pic>
         <p:nvPicPr>
-          <p:cNvPr id="219" name="Google Shape;219;p25"/>
+          <p:cNvPr id="221" name="Google Shape;221;p25"/>
           <p:cNvPicPr preferRelativeResize="0"/>
           <p:nvPr/>
         </p:nvPicPr>
@@ -19646,7 +19646,7 @@
       </p:pic>
       <p:pic>
         <p:nvPicPr>
-          <p:cNvPr id="220" name="Google Shape;220;p25"/>
+          <p:cNvPr id="222" name="Google Shape;222;p25"/>
           <p:cNvPicPr preferRelativeResize="0"/>
           <p:nvPr/>
         </p:nvPicPr>
@@ -19674,7 +19674,7 @@
       </p:pic>
       <p:cxnSp>
         <p:nvCxnSpPr>
-          <p:cNvPr id="221" name="Google Shape;221;p25"/>
+          <p:cNvPr id="223" name="Google Shape;223;p25"/>
           <p:cNvCxnSpPr/>
           <p:nvPr/>
         </p:nvCxnSpPr>
@@ -19700,7 +19700,7 @@
       </p:cxnSp>
       <p:sp>
         <p:nvSpPr>
-          <p:cNvPr id="222" name="Google Shape;222;p25"/>
+          <p:cNvPr id="224" name="Google Shape;224;p25"/>
           <p:cNvSpPr txBox="1"/>
           <p:nvPr/>
         </p:nvSpPr>
@@ -19742,7 +19742,7 @@
       </p:sp>
       <p:cxnSp>
         <p:nvCxnSpPr>
-          <p:cNvPr id="223" name="Google Shape;223;p25"/>
+          <p:cNvPr id="225" name="Google Shape;225;p25"/>
           <p:cNvCxnSpPr/>
           <p:nvPr/>
         </p:nvCxnSpPr>
@@ -19768,7 +19768,7 @@
       </p:cxnSp>
       <p:sp>
         <p:nvSpPr>
-          <p:cNvPr id="224" name="Google Shape;224;p25"/>
+          <p:cNvPr id="226" name="Google Shape;226;p25"/>
           <p:cNvSpPr txBox="1"/>
           <p:nvPr/>
         </p:nvSpPr>
@@ -19810,7 +19810,7 @@
       </p:sp>
       <p:pic>
         <p:nvPicPr>
-          <p:cNvPr id="225" name="Google Shape;225;p25"/>
+          <p:cNvPr id="227" name="Google Shape;227;p25"/>
           <p:cNvPicPr preferRelativeResize="0"/>
           <p:nvPr/>
         </p:nvPicPr>
@@ -19838,7 +19838,7 @@
       </p:pic>
       <p:pic>
         <p:nvPicPr>
-          <p:cNvPr id="226" name="Google Shape;226;p25"/>
+          <p:cNvPr id="228" name="Google Shape;228;p25"/>
           <p:cNvPicPr preferRelativeResize="0"/>
           <p:nvPr/>
         </p:nvPicPr>
@@ -19866,7 +19866,7 @@
       </p:pic>
       <p:sp>
         <p:nvSpPr>
-          <p:cNvPr id="227" name="Google Shape;227;p25"/>
+          <p:cNvPr id="229" name="Google Shape;229;p25"/>
           <p:cNvSpPr/>
           <p:nvPr/>
         </p:nvSpPr>
@@ -19918,7 +19918,7 @@
       </p:sp>
       <p:sp>
         <p:nvSpPr>
-          <p:cNvPr id="228" name="Google Shape;228;p25"/>
+          <p:cNvPr id="230" name="Google Shape;230;p25"/>
           <p:cNvSpPr/>
           <p:nvPr/>
         </p:nvSpPr>
@@ -19981,7 +19981,7 @@
   <p:cSld>
     <p:spTree>
       <p:nvGrpSpPr>
-        <p:cNvPr id="232" name="Shape 232"/>
+        <p:cNvPr id="234" name="Shape 234"/>
         <p:cNvGrpSpPr/>
         <p:nvPr/>
       </p:nvGrpSpPr>
@@ -19995,7 +19995,7 @@
       </p:grpSpPr>
       <p:sp>
         <p:nvSpPr>
-          <p:cNvPr id="233" name="Google Shape;233;p26"/>
+          <p:cNvPr id="235" name="Google Shape;235;p26"/>
           <p:cNvSpPr txBox="1"/>
           <p:nvPr>
             <p:ph type="title"/>
@@ -20058,7 +20058,7 @@
       </p:sp>
       <p:sp>
         <p:nvSpPr>
-          <p:cNvPr id="234" name="Google Shape;234;p26"/>
+          <p:cNvPr id="236" name="Google Shape;236;p26"/>
           <p:cNvSpPr txBox="1"/>
           <p:nvPr/>
         </p:nvSpPr>
@@ -20235,7 +20235,7 @@
       </p:sp>
       <p:sp>
         <p:nvSpPr>
-          <p:cNvPr id="235" name="Google Shape;235;p26"/>
+          <p:cNvPr id="237" name="Google Shape;237;p26"/>
           <p:cNvSpPr txBox="1"/>
           <p:nvPr>
             <p:ph idx="12" type="sldNum"/>
@@ -20283,7 +20283,7 @@
       </p:sp>
       <p:pic>
         <p:nvPicPr>
-          <p:cNvPr id="236" name="Google Shape;236;p26"/>
+          <p:cNvPr id="238" name="Google Shape;238;p26"/>
           <p:cNvPicPr preferRelativeResize="0"/>
           <p:nvPr/>
         </p:nvPicPr>
@@ -20311,7 +20311,7 @@
       </p:pic>
       <p:sp>
         <p:nvSpPr>
-          <p:cNvPr id="237" name="Google Shape;237;p26"/>
+          <p:cNvPr id="239" name="Google Shape;239;p26"/>
           <p:cNvSpPr/>
           <p:nvPr/>
         </p:nvSpPr>
@@ -20361,7 +20361,7 @@
       </p:sp>
       <p:pic>
         <p:nvPicPr>
-          <p:cNvPr id="238" name="Google Shape;238;p26"/>
+          <p:cNvPr id="240" name="Google Shape;240;p26"/>
           <p:cNvPicPr preferRelativeResize="0"/>
           <p:nvPr/>
         </p:nvPicPr>
@@ -20389,7 +20389,7 @@
       </p:pic>
       <p:cxnSp>
         <p:nvCxnSpPr>
-          <p:cNvPr id="239" name="Google Shape;239;p26"/>
+          <p:cNvPr id="241" name="Google Shape;241;p26"/>
           <p:cNvCxnSpPr/>
           <p:nvPr/>
         </p:nvCxnSpPr>
@@ -20415,7 +20415,7 @@
       </p:cxnSp>
       <p:sp>
         <p:nvSpPr>
-          <p:cNvPr id="240" name="Google Shape;240;p26"/>
+          <p:cNvPr id="242" name="Google Shape;242;p26"/>
           <p:cNvSpPr txBox="1"/>
           <p:nvPr/>
         </p:nvSpPr>
@@ -20457,7 +20457,7 @@
       </p:sp>
       <p:cxnSp>
         <p:nvCxnSpPr>
-          <p:cNvPr id="241" name="Google Shape;241;p26"/>
+          <p:cNvPr id="243" name="Google Shape;243;p26"/>
           <p:cNvCxnSpPr/>
           <p:nvPr/>
         </p:nvCxnSpPr>
@@ -20483,7 +20483,7 @@
       </p:cxnSp>
       <p:sp>
         <p:nvSpPr>
-          <p:cNvPr id="242" name="Google Shape;242;p26"/>
+          <p:cNvPr id="244" name="Google Shape;244;p26"/>
           <p:cNvSpPr txBox="1"/>
           <p:nvPr/>
         </p:nvSpPr>
@@ -20525,7 +20525,7 @@
       </p:sp>
       <p:sp>
         <p:nvSpPr>
-          <p:cNvPr id="243" name="Google Shape;243;p26"/>
+          <p:cNvPr id="245" name="Google Shape;245;p26"/>
           <p:cNvSpPr txBox="1"/>
           <p:nvPr/>
         </p:nvSpPr>
@@ -20583,7 +20583,7 @@
       </p:sp>
       <p:pic>
         <p:nvPicPr>
-          <p:cNvPr id="244" name="Google Shape;244;p26"/>
+          <p:cNvPr id="246" name="Google Shape;246;p26"/>
           <p:cNvPicPr preferRelativeResize="0"/>
           <p:nvPr/>
         </p:nvPicPr>
@@ -20611,7 +20611,7 @@
       </p:pic>
       <p:pic>
         <p:nvPicPr>
-          <p:cNvPr id="245" name="Google Shape;245;p26"/>
+          <p:cNvPr id="247" name="Google Shape;247;p26"/>
           <p:cNvPicPr preferRelativeResize="0"/>
           <p:nvPr/>
         </p:nvPicPr>
@@ -20639,7 +20639,7 @@
       </p:pic>
       <p:cxnSp>
         <p:nvCxnSpPr>
-          <p:cNvPr id="246" name="Google Shape;246;p26"/>
+          <p:cNvPr id="248" name="Google Shape;248;p26"/>
           <p:cNvCxnSpPr/>
           <p:nvPr/>
         </p:nvCxnSpPr>
@@ -20665,7 +20665,7 @@
       </p:cxnSp>
       <p:sp>
         <p:nvSpPr>
-          <p:cNvPr id="247" name="Google Shape;247;p26"/>
+          <p:cNvPr id="249" name="Google Shape;249;p26"/>
           <p:cNvSpPr txBox="1"/>
           <p:nvPr/>
         </p:nvSpPr>
@@ -20735,7 +20735,7 @@
       </p:sp>
       <p:cxnSp>
         <p:nvCxnSpPr>
-          <p:cNvPr id="248" name="Google Shape;248;p26"/>
+          <p:cNvPr id="250" name="Google Shape;250;p26"/>
           <p:cNvCxnSpPr/>
           <p:nvPr/>
         </p:nvCxnSpPr>
@@ -20761,7 +20761,7 @@
       </p:cxnSp>
       <p:sp>
         <p:nvSpPr>
-          <p:cNvPr id="249" name="Google Shape;249;p26"/>
+          <p:cNvPr id="251" name="Google Shape;251;p26"/>
           <p:cNvSpPr txBox="1"/>
           <p:nvPr/>
         </p:nvSpPr>
@@ -20831,7 +20831,7 @@
       </p:sp>
       <p:sp>
         <p:nvSpPr>
-          <p:cNvPr id="250" name="Google Shape;250;p26"/>
+          <p:cNvPr id="252" name="Google Shape;252;p26"/>
           <p:cNvSpPr txBox="1"/>
           <p:nvPr/>
         </p:nvSpPr>
@@ -20901,7 +20901,7 @@
       </p:sp>
       <p:sp>
         <p:nvSpPr>
-          <p:cNvPr id="251" name="Google Shape;251;p26"/>
+          <p:cNvPr id="253" name="Google Shape;253;p26"/>
           <p:cNvSpPr txBox="1"/>
           <p:nvPr/>
         </p:nvSpPr>
@@ -20959,7 +20959,7 @@
       </p:sp>
       <p:pic>
         <p:nvPicPr>
-          <p:cNvPr id="252" name="Google Shape;252;p26"/>
+          <p:cNvPr id="254" name="Google Shape;254;p26"/>
           <p:cNvPicPr preferRelativeResize="0"/>
           <p:nvPr/>
         </p:nvPicPr>
@@ -20987,7 +20987,7 @@
       </p:pic>
       <p:pic>
         <p:nvPicPr>
-          <p:cNvPr id="253" name="Google Shape;253;p26"/>
+          <p:cNvPr id="255" name="Google Shape;255;p26"/>
           <p:cNvPicPr preferRelativeResize="0"/>
           <p:nvPr/>
         </p:nvPicPr>
@@ -21026,7 +21026,7 @@
   <p:cSld>
     <p:spTree>
       <p:nvGrpSpPr>
-        <p:cNvPr id="257" name="Shape 257"/>
+        <p:cNvPr id="259" name="Shape 259"/>
         <p:cNvGrpSpPr/>
         <p:nvPr/>
       </p:nvGrpSpPr>
@@ -21040,7 +21040,7 @@
       </p:grpSpPr>
       <p:sp>
         <p:nvSpPr>
-          <p:cNvPr id="258" name="Google Shape;258;p27"/>
+          <p:cNvPr id="260" name="Google Shape;260;p27"/>
           <p:cNvSpPr txBox="1"/>
           <p:nvPr>
             <p:ph type="title"/>
@@ -21103,7 +21103,7 @@
       </p:sp>
       <p:sp>
         <p:nvSpPr>
-          <p:cNvPr id="259" name="Google Shape;259;p27"/>
+          <p:cNvPr id="261" name="Google Shape;261;p27"/>
           <p:cNvSpPr txBox="1"/>
           <p:nvPr>
             <p:ph idx="12" type="sldNum"/>
@@ -21151,7 +21151,7 @@
       </p:sp>
       <p:pic>
         <p:nvPicPr>
-          <p:cNvPr id="260" name="Google Shape;260;p27"/>
+          <p:cNvPr id="262" name="Google Shape;262;p27"/>
           <p:cNvPicPr preferRelativeResize="0"/>
           <p:nvPr/>
         </p:nvPicPr>
@@ -21179,7 +21179,7 @@
       </p:pic>
       <p:sp>
         <p:nvSpPr>
-          <p:cNvPr id="261" name="Google Shape;261;p27"/>
+          <p:cNvPr id="263" name="Google Shape;263;p27"/>
           <p:cNvSpPr txBox="1"/>
           <p:nvPr/>
         </p:nvSpPr>
@@ -21425,7 +21425,7 @@
   <p:cSld>
     <p:spTree>
       <p:nvGrpSpPr>
-        <p:cNvPr id="265" name="Shape 265"/>
+        <p:cNvPr id="267" name="Shape 267"/>
         <p:cNvGrpSpPr/>
         <p:nvPr/>
       </p:nvGrpSpPr>
@@ -21439,7 +21439,7 @@
       </p:grpSpPr>
       <p:sp>
         <p:nvSpPr>
-          <p:cNvPr id="266" name="Google Shape;266;p28"/>
+          <p:cNvPr id="268" name="Google Shape;268;p28"/>
           <p:cNvSpPr txBox="1"/>
           <p:nvPr>
             <p:ph type="title"/>
@@ -21502,7 +21502,7 @@
       </p:sp>
       <p:sp>
         <p:nvSpPr>
-          <p:cNvPr id="267" name="Google Shape;267;p28"/>
+          <p:cNvPr id="269" name="Google Shape;269;p28"/>
           <p:cNvSpPr txBox="1"/>
           <p:nvPr>
             <p:ph idx="12" type="sldNum"/>
@@ -21550,7 +21550,7 @@
       </p:sp>
       <p:sp>
         <p:nvSpPr>
-          <p:cNvPr id="268" name="Google Shape;268;p28"/>
+          <p:cNvPr id="270" name="Google Shape;270;p28"/>
           <p:cNvSpPr txBox="1"/>
           <p:nvPr/>
         </p:nvSpPr>
@@ -21699,7 +21699,7 @@
       </p:sp>
       <p:pic>
         <p:nvPicPr>
-          <p:cNvPr id="269" name="Google Shape;269;p28"/>
+          <p:cNvPr id="271" name="Google Shape;271;p28"/>
           <p:cNvPicPr preferRelativeResize="0"/>
           <p:nvPr/>
         </p:nvPicPr>
@@ -21727,7 +21727,7 @@
       </p:pic>
       <p:pic>
         <p:nvPicPr>
-          <p:cNvPr id="270" name="Google Shape;270;p28"/>
+          <p:cNvPr id="272" name="Google Shape;272;p28"/>
           <p:cNvPicPr preferRelativeResize="0"/>
           <p:nvPr/>
         </p:nvPicPr>
@@ -23791,7 +23791,7 @@
         <p:spPr>
           <a:xfrm>
             <a:off x="838200" y="1522975"/>
-            <a:ext cx="10155000" cy="3330000"/>
+            <a:ext cx="10155000" cy="2067600"/>
           </a:xfrm>
           <a:prstGeom prst="rect">
             <a:avLst/>
@@ -23923,7 +23923,7 @@
                 <a:spcPts val="0"/>
               </a:spcBef>
               <a:spcAft>
-                <a:spcPts val="0"/>
+                <a:spcPts val="1000"/>
               </a:spcAft>
               <a:buClr>
                 <a:schemeClr val="dk1"/>
@@ -23979,75 +23979,6 @@
                 <a:sym typeface="Calibri"/>
               </a:rPr>
               <a:t> if all active subscriptions are terminated (less disruptive)</a:t>
-            </a:r>
-            <a:endParaRPr sz="1900">
-              <a:solidFill>
-                <a:schemeClr val="dk1"/>
-              </a:solidFill>
-              <a:latin typeface="Calibri"/>
-              <a:ea typeface="Calibri"/>
-              <a:cs typeface="Calibri"/>
-              <a:sym typeface="Calibri"/>
-            </a:endParaRPr>
-          </a:p>
-          <a:p>
-            <a:pPr indent="0" lvl="0" marL="0" rtl="0" algn="l">
-              <a:spcBef>
-                <a:spcPts val="1000"/>
-              </a:spcBef>
-              <a:spcAft>
-                <a:spcPts val="0"/>
-              </a:spcAft>
-              <a:buNone/>
-            </a:pPr>
-            <a:r>
-              <a:t/>
-            </a:r>
-            <a:endParaRPr sz="1900">
-              <a:solidFill>
-                <a:schemeClr val="dk1"/>
-              </a:solidFill>
-              <a:latin typeface="Calibri"/>
-              <a:ea typeface="Calibri"/>
-              <a:cs typeface="Calibri"/>
-              <a:sym typeface="Calibri"/>
-            </a:endParaRPr>
-          </a:p>
-          <a:p>
-            <a:pPr indent="0" lvl="0" marL="0" rtl="0" algn="l">
-              <a:spcBef>
-                <a:spcPts val="1000"/>
-              </a:spcBef>
-              <a:spcAft>
-                <a:spcPts val="0"/>
-              </a:spcAft>
-              <a:buNone/>
-            </a:pPr>
-            <a:r>
-              <a:t/>
-            </a:r>
-            <a:endParaRPr sz="1900">
-              <a:solidFill>
-                <a:schemeClr val="dk1"/>
-              </a:solidFill>
-              <a:latin typeface="Calibri"/>
-              <a:ea typeface="Calibri"/>
-              <a:cs typeface="Calibri"/>
-              <a:sym typeface="Calibri"/>
-            </a:endParaRPr>
-          </a:p>
-          <a:p>
-            <a:pPr indent="0" lvl="0" marL="0" rtl="0" algn="l">
-              <a:spcBef>
-                <a:spcPts val="1000"/>
-              </a:spcBef>
-              <a:spcAft>
-                <a:spcPts val="1000"/>
-              </a:spcAft>
-              <a:buNone/>
-            </a:pPr>
-            <a:r>
-              <a:t/>
             </a:r>
             <a:endParaRPr sz="1900">
               <a:solidFill>
@@ -24180,6 +24111,92 @@
           </a:p>
         </p:txBody>
       </p:sp>
+      <p:pic>
+        <p:nvPicPr>
+          <p:cNvPr id="127" name="Google Shape;127;p17" title="Screenshot 2025-10-24 at 15.29.52.png"/>
+          <p:cNvPicPr preferRelativeResize="0"/>
+          <p:nvPr/>
+        </p:nvPicPr>
+        <p:blipFill>
+          <a:blip r:embed="rId3">
+            <a:alphaModFix/>
+          </a:blip>
+          <a:stretch>
+            <a:fillRect/>
+          </a:stretch>
+        </p:blipFill>
+        <p:spPr>
+          <a:xfrm>
+            <a:off x="3256625" y="3810750"/>
+            <a:ext cx="5678752" cy="1700225"/>
+          </a:xfrm>
+          <a:prstGeom prst="rect">
+            <a:avLst/>
+          </a:prstGeom>
+          <a:noFill/>
+          <a:ln>
+            <a:noFill/>
+          </a:ln>
+        </p:spPr>
+      </p:pic>
+      <p:sp>
+        <p:nvSpPr>
+          <p:cNvPr id="128" name="Google Shape;128;p17"/>
+          <p:cNvSpPr txBox="1"/>
+          <p:nvPr/>
+        </p:nvSpPr>
+        <p:spPr>
+          <a:xfrm>
+            <a:off x="3547500" y="5510975"/>
+            <a:ext cx="5097000" cy="415500"/>
+          </a:xfrm>
+          <a:prstGeom prst="rect">
+            <a:avLst/>
+          </a:prstGeom>
+          <a:noFill/>
+          <a:ln>
+            <a:noFill/>
+          </a:ln>
+        </p:spPr>
+        <p:txBody>
+          <a:bodyPr anchorCtr="0" anchor="t" bIns="91425" lIns="91425" spcFirstLastPara="1" rIns="91425" wrap="square" tIns="91425">
+            <a:spAutoFit/>
+          </a:bodyPr>
+          <a:lstStyle/>
+          <a:p>
+            <a:pPr indent="0" lvl="0" marL="0" rtl="0" algn="ctr">
+              <a:spcBef>
+                <a:spcPts val="0"/>
+              </a:spcBef>
+              <a:spcAft>
+                <a:spcPts val="0"/>
+              </a:spcAft>
+              <a:buNone/>
+            </a:pPr>
+            <a:r>
+              <a:rPr lang="en" sz="1500">
+                <a:solidFill>
+                  <a:schemeClr val="dk1"/>
+                </a:solidFill>
+                <a:latin typeface="Calibri"/>
+                <a:ea typeface="Calibri"/>
+                <a:cs typeface="Calibri"/>
+                <a:sym typeface="Calibri"/>
+              </a:rPr>
+              <a:t>Proposal from the authors</a:t>
+            </a:r>
+            <a:endParaRPr sz="1500">
+              <a:solidFill>
+                <a:schemeClr val="dk1"/>
+              </a:solidFill>
+              <a:latin typeface="Calibri"/>
+              <a:ea typeface="Calibri"/>
+              <a:cs typeface="Calibri"/>
+              <a:sym typeface="Calibri"/>
+            </a:endParaRPr>
+          </a:p>
+        </p:txBody>
+      </p:sp>
     </p:spTree>
   </p:cSld>
   <p:clrMapOvr>
@@ -24193,7 +24210,7 @@
   <p:cSld>
     <p:spTree>
       <p:nvGrpSpPr>
-        <p:cNvPr id="130" name="Shape 130"/>
+        <p:cNvPr id="132" name="Shape 132"/>
         <p:cNvGrpSpPr/>
         <p:nvPr/>
       </p:nvGrpSpPr>
@@ -24207,7 +24224,7 @@
       </p:grpSpPr>
       <p:sp>
         <p:nvSpPr>
-          <p:cNvPr id="131" name="Google Shape;131;p18"/>
+          <p:cNvPr id="133" name="Google Shape;133;p18"/>
           <p:cNvSpPr txBox="1"/>
           <p:nvPr>
             <p:ph type="title"/>
@@ -24278,7 +24295,7 @@
       </p:sp>
       <p:sp>
         <p:nvSpPr>
-          <p:cNvPr id="132" name="Google Shape;132;p18"/>
+          <p:cNvPr id="134" name="Google Shape;134;p18"/>
           <p:cNvSpPr txBox="1"/>
           <p:nvPr/>
         </p:nvSpPr>
@@ -24401,7 +24418,7 @@
       </p:sp>
       <p:sp>
         <p:nvSpPr>
-          <p:cNvPr id="133" name="Google Shape;133;p18"/>
+          <p:cNvPr id="135" name="Google Shape;135;p18"/>
           <p:cNvSpPr txBox="1"/>
           <p:nvPr>
             <p:ph idx="12" type="sldNum"/>
@@ -24460,7 +24477,7 @@
   <p:cSld>
     <p:spTree>
       <p:nvGrpSpPr>
-        <p:cNvPr id="138" name="Shape 138"/>
+        <p:cNvPr id="140" name="Shape 140"/>
         <p:cNvGrpSpPr/>
         <p:nvPr/>
       </p:nvGrpSpPr>
@@ -24474,7 +24491,7 @@
       </p:grpSpPr>
       <p:sp>
         <p:nvSpPr>
-          <p:cNvPr id="139" name="Google Shape;139;p19"/>
+          <p:cNvPr id="141" name="Google Shape;141;p19"/>
           <p:cNvSpPr txBox="1"/>
           <p:nvPr>
             <p:ph type="ctrTitle"/>
@@ -24514,7 +24531,7 @@
       </p:sp>
       <p:sp>
         <p:nvSpPr>
-          <p:cNvPr id="140" name="Google Shape;140;p19"/>
+          <p:cNvPr id="142" name="Google Shape;142;p19"/>
           <p:cNvSpPr txBox="1"/>
           <p:nvPr>
             <p:ph idx="1" type="subTitle"/>
@@ -24564,7 +24581,7 @@
   <p:cSld>
     <p:spTree>
       <p:nvGrpSpPr>
-        <p:cNvPr id="144" name="Shape 144"/>
+        <p:cNvPr id="146" name="Shape 146"/>
         <p:cNvGrpSpPr/>
         <p:nvPr/>
       </p:nvGrpSpPr>
@@ -24578,7 +24595,7 @@
       </p:grpSpPr>
       <p:sp>
         <p:nvSpPr>
-          <p:cNvPr id="145" name="Google Shape;145;p20"/>
+          <p:cNvPr id="147" name="Google Shape;147;p20"/>
           <p:cNvSpPr txBox="1"/>
           <p:nvPr>
             <p:ph type="title"/>
@@ -24641,7 +24658,7 @@
       </p:sp>
       <p:sp>
         <p:nvSpPr>
-          <p:cNvPr id="146" name="Google Shape;146;p20"/>
+          <p:cNvPr id="148" name="Google Shape;148;p20"/>
           <p:cNvSpPr txBox="1"/>
           <p:nvPr/>
         </p:nvSpPr>
@@ -24818,7 +24835,7 @@
       </p:sp>
       <p:sp>
         <p:nvSpPr>
-          <p:cNvPr id="147" name="Google Shape;147;p20"/>
+          <p:cNvPr id="149" name="Google Shape;149;p20"/>
           <p:cNvSpPr txBox="1"/>
           <p:nvPr>
             <p:ph idx="12" type="sldNum"/>
@@ -24866,7 +24883,7 @@
       </p:sp>
       <p:pic>
         <p:nvPicPr>
-          <p:cNvPr id="148" name="Google Shape;148;p20"/>
+          <p:cNvPr id="150" name="Google Shape;150;p20"/>
           <p:cNvPicPr preferRelativeResize="0"/>
           <p:nvPr/>
         </p:nvPicPr>
@@ -24894,7 +24911,7 @@
       </p:pic>
       <p:sp>
         <p:nvSpPr>
-          <p:cNvPr id="149" name="Google Shape;149;p20"/>
+          <p:cNvPr id="151" name="Google Shape;151;p20"/>
           <p:cNvSpPr/>
           <p:nvPr/>
         </p:nvSpPr>
@@ -24944,7 +24961,7 @@
       </p:sp>
       <p:pic>
         <p:nvPicPr>
-          <p:cNvPr id="150" name="Google Shape;150;p20"/>
+          <p:cNvPr id="152" name="Google Shape;152;p20"/>
           <p:cNvPicPr preferRelativeResize="0"/>
           <p:nvPr/>
         </p:nvPicPr>
@@ -24972,7 +24989,7 @@
       </p:pic>
       <p:cxnSp>
         <p:nvCxnSpPr>
-          <p:cNvPr id="151" name="Google Shape;151;p20"/>
+          <p:cNvPr id="153" name="Google Shape;153;p20"/>
           <p:cNvCxnSpPr/>
           <p:nvPr/>
         </p:nvCxnSpPr>
@@ -24998,7 +25015,7 @@
       </p:cxnSp>
       <p:sp>
         <p:nvSpPr>
-          <p:cNvPr id="152" name="Google Shape;152;p20"/>
+          <p:cNvPr id="154" name="Google Shape;154;p20"/>
           <p:cNvSpPr txBox="1"/>
           <p:nvPr/>
         </p:nvSpPr>
@@ -25040,7 +25057,7 @@
       </p:sp>
       <p:cxnSp>
         <p:nvCxnSpPr>
-          <p:cNvPr id="153" name="Google Shape;153;p20"/>
+          <p:cNvPr id="155" name="Google Shape;155;p20"/>
           <p:cNvCxnSpPr/>
           <p:nvPr/>
         </p:nvCxnSpPr>
@@ -25066,7 +25083,7 @@
       </p:cxnSp>
       <p:sp>
         <p:nvSpPr>
-          <p:cNvPr id="154" name="Google Shape;154;p20"/>
+          <p:cNvPr id="156" name="Google Shape;156;p20"/>
           <p:cNvSpPr txBox="1"/>
           <p:nvPr/>
         </p:nvSpPr>
@@ -25108,7 +25125,7 @@
       </p:sp>
       <p:sp>
         <p:nvSpPr>
-          <p:cNvPr id="155" name="Google Shape;155;p20"/>
+          <p:cNvPr id="157" name="Google Shape;157;p20"/>
           <p:cNvSpPr txBox="1"/>
           <p:nvPr/>
         </p:nvSpPr>
@@ -25166,7 +25183,7 @@
       </p:sp>
       <p:pic>
         <p:nvPicPr>
-          <p:cNvPr id="156" name="Google Shape;156;p20"/>
+          <p:cNvPr id="158" name="Google Shape;158;p20"/>
           <p:cNvPicPr preferRelativeResize="0"/>
           <p:nvPr/>
         </p:nvPicPr>
@@ -25194,7 +25211,7 @@
       </p:pic>
       <p:pic>
         <p:nvPicPr>
-          <p:cNvPr id="157" name="Google Shape;157;p20"/>
+          <p:cNvPr id="159" name="Google Shape;159;p20"/>
           <p:cNvPicPr preferRelativeResize="0"/>
           <p:nvPr/>
         </p:nvPicPr>
@@ -25222,7 +25239,7 @@
       </p:pic>
       <p:cxnSp>
         <p:nvCxnSpPr>
-          <p:cNvPr id="158" name="Google Shape;158;p20"/>
+          <p:cNvPr id="160" name="Google Shape;160;p20"/>
           <p:cNvCxnSpPr/>
           <p:nvPr/>
         </p:nvCxnSpPr>
@@ -25248,7 +25265,7 @@
       </p:cxnSp>
       <p:sp>
         <p:nvSpPr>
-          <p:cNvPr id="159" name="Google Shape;159;p20"/>
+          <p:cNvPr id="161" name="Google Shape;161;p20"/>
           <p:cNvSpPr txBox="1"/>
           <p:nvPr/>
         </p:nvSpPr>
@@ -25318,7 +25335,7 @@
       </p:sp>
       <p:cxnSp>
         <p:nvCxnSpPr>
-          <p:cNvPr id="160" name="Google Shape;160;p20"/>
+          <p:cNvPr id="162" name="Google Shape;162;p20"/>
           <p:cNvCxnSpPr/>
           <p:nvPr/>
         </p:nvCxnSpPr>
@@ -25344,7 +25361,7 @@
       </p:cxnSp>
       <p:sp>
         <p:nvSpPr>
-          <p:cNvPr id="161" name="Google Shape;161;p20"/>
+          <p:cNvPr id="163" name="Google Shape;163;p20"/>
           <p:cNvSpPr txBox="1"/>
           <p:nvPr/>
         </p:nvSpPr>
@@ -25414,7 +25431,7 @@
       </p:sp>
       <p:sp>
         <p:nvSpPr>
-          <p:cNvPr id="162" name="Google Shape;162;p20"/>
+          <p:cNvPr id="164" name="Google Shape;164;p20"/>
           <p:cNvSpPr txBox="1"/>
           <p:nvPr/>
         </p:nvSpPr>
@@ -25472,7 +25489,7 @@
       </p:sp>
       <p:sp>
         <p:nvSpPr>
-          <p:cNvPr id="163" name="Google Shape;163;p20"/>
+          <p:cNvPr id="165" name="Google Shape;165;p20"/>
           <p:cNvSpPr txBox="1"/>
           <p:nvPr/>
         </p:nvSpPr>
@@ -25530,7 +25547,7 @@
       </p:sp>
       <p:pic>
         <p:nvPicPr>
-          <p:cNvPr id="164" name="Google Shape;164;p20"/>
+          <p:cNvPr id="166" name="Google Shape;166;p20"/>
           <p:cNvPicPr preferRelativeResize="0"/>
           <p:nvPr/>
         </p:nvPicPr>
@@ -25558,7 +25575,7 @@
       </p:pic>
       <p:pic>
         <p:nvPicPr>
-          <p:cNvPr id="165" name="Google Shape;165;p20"/>
+          <p:cNvPr id="167" name="Google Shape;167;p20"/>
           <p:cNvPicPr preferRelativeResize="0"/>
           <p:nvPr/>
         </p:nvPicPr>
@@ -25597,7 +25614,7 @@
   <p:cSld>
     <p:spTree>
       <p:nvGrpSpPr>
-        <p:cNvPr id="169" name="Shape 169"/>
+        <p:cNvPr id="171" name="Shape 171"/>
         <p:cNvGrpSpPr/>
         <p:nvPr/>
       </p:nvGrpSpPr>
@@ -25611,7 +25628,7 @@
       </p:grpSpPr>
       <p:sp>
         <p:nvSpPr>
-          <p:cNvPr id="170" name="Google Shape;170;p21"/>
+          <p:cNvPr id="172" name="Google Shape;172;p21"/>
           <p:cNvSpPr txBox="1"/>
           <p:nvPr>
             <p:ph type="title"/>
@@ -25674,7 +25691,7 @@
       </p:sp>
       <p:sp>
         <p:nvSpPr>
-          <p:cNvPr id="171" name="Google Shape;171;p21"/>
+          <p:cNvPr id="173" name="Google Shape;173;p21"/>
           <p:cNvSpPr txBox="1"/>
           <p:nvPr>
             <p:ph idx="12" type="sldNum"/>
@@ -25722,7 +25739,7 @@
       </p:sp>
       <p:sp>
         <p:nvSpPr>
-          <p:cNvPr id="172" name="Google Shape;172;p21"/>
+          <p:cNvPr id="174" name="Google Shape;174;p21"/>
           <p:cNvSpPr txBox="1"/>
           <p:nvPr/>
         </p:nvSpPr>

</xml_diff>

<commit_message>
feedback Thomas and Benoit
</commit_message>
<xml_diff>
--- a/124/NETCONF/draft-ietf-netconf-notif-envelope-03.pptx
+++ b/124/NETCONF/draft-ietf-netconf-notif-envelope-03.pptx
@@ -22026,7 +22026,23 @@
                   <a:schemeClr val="dk1"/>
                 </a:solidFill>
               </a:rPr>
-              <a:t>”</a:t>
+              <a:t>” (more of a “</a:t>
+            </a:r>
+            <a:r>
+              <a:rPr i="1" lang="en" sz="1800">
+                <a:solidFill>
+                  <a:schemeClr val="dk1"/>
+                </a:solidFill>
+              </a:rPr>
+              <a:t>discuss</a:t>
+            </a:r>
+            <a:r>
+              <a:rPr lang="en" sz="1800">
+                <a:solidFill>
+                  <a:schemeClr val="dk1"/>
+                </a:solidFill>
+              </a:rPr>
+              <a:t>”)</a:t>
             </a:r>
             <a:endParaRPr sz="1800">
               <a:solidFill>
@@ -22104,7 +22120,7 @@
                   <a:schemeClr val="dk1"/>
                 </a:solidFill>
               </a:rPr>
-              <a:t>No feedback received from CORE WG yet</a:t>
+              <a:t>No feedback received from CORE WG</a:t>
             </a:r>
             <a:endParaRPr sz="1800">
               <a:solidFill>
@@ -22135,7 +22151,7 @@
                   <a:schemeClr val="dk1"/>
                 </a:solidFill>
               </a:rPr>
-              <a:t>Received reviews from Paul Aitken, Qin Wu, Rob Wilton, Reshad Rahman, Jürgen Schönwälder and Joe Clark</a:t>
+              <a:t>Received reviews from Andy Bierman, Paul Aitken, Qin Wu, Rob Wilton, Reshad Rahman, Jürgen Schönwälder and Joe Clark</a:t>
             </a:r>
             <a:endParaRPr sz="1800">
               <a:solidFill>
@@ -23167,7 +23183,7 @@
         </p:nvSpPr>
         <p:spPr>
           <a:xfrm>
-            <a:off x="838200" y="1488685"/>
+            <a:off x="838200" y="1400195"/>
             <a:ext cx="10155000" cy="446400"/>
           </a:xfrm>
           <a:prstGeom prst="rect">
@@ -23286,7 +23302,7 @@
         </p:blipFill>
         <p:spPr>
           <a:xfrm>
-            <a:off x="905875" y="2049525"/>
+            <a:off x="905875" y="1828299"/>
             <a:ext cx="4668175" cy="2268475"/>
           </a:xfrm>
           <a:prstGeom prst="rect">
@@ -23314,7 +23330,7 @@
         </p:blipFill>
         <p:spPr>
           <a:xfrm>
-            <a:off x="6251298" y="2031738"/>
+            <a:off x="6251298" y="1810512"/>
             <a:ext cx="5258702" cy="2268475"/>
           </a:xfrm>
           <a:prstGeom prst="rect">
@@ -23334,7 +23350,7 @@
         </p:nvSpPr>
         <p:spPr>
           <a:xfrm>
-            <a:off x="1515250" y="3424625"/>
+            <a:off x="1515250" y="3203399"/>
             <a:ext cx="2128200" cy="175200"/>
           </a:xfrm>
           <a:prstGeom prst="rect">
@@ -23381,12 +23397,294 @@
       <p:sp>
         <p:nvSpPr>
           <p:cNvPr id="116" name="Google Shape;116;p16"/>
+          <p:cNvSpPr txBox="1"/>
+          <p:nvPr/>
+        </p:nvSpPr>
+        <p:spPr>
+          <a:xfrm>
+            <a:off x="905875" y="4463900"/>
+            <a:ext cx="10287000" cy="2011200"/>
+          </a:xfrm>
+          <a:prstGeom prst="rect">
+            <a:avLst/>
+          </a:prstGeom>
+          <a:noFill/>
+          <a:ln>
+            <a:noFill/>
+          </a:ln>
+        </p:spPr>
+        <p:txBody>
+          <a:bodyPr anchorCtr="0" anchor="t" bIns="91425" lIns="91425" spcFirstLastPara="1" rIns="91425" wrap="square" tIns="91425">
+            <a:spAutoFit/>
+          </a:bodyPr>
+          <a:lstStyle/>
+          <a:p>
+            <a:pPr indent="0" lvl="0" marL="0" rtl="0" algn="l">
+              <a:spcBef>
+                <a:spcPts val="0"/>
+              </a:spcBef>
+              <a:spcAft>
+                <a:spcPts val="0"/>
+              </a:spcAft>
+              <a:buNone/>
+            </a:pPr>
+            <a:r>
+              <a:rPr b="1" lang="en" sz="1700">
+                <a:solidFill>
+                  <a:schemeClr val="dk1"/>
+                </a:solidFill>
+                <a:latin typeface="Calibri"/>
+                <a:ea typeface="Calibri"/>
+                <a:cs typeface="Calibri"/>
+                <a:sym typeface="Calibri"/>
+              </a:rPr>
+              <a:t>Reasons in favor of “observed-timestamp”</a:t>
+            </a:r>
+            <a:r>
+              <a:rPr lang="en" sz="1700">
+                <a:solidFill>
+                  <a:schemeClr val="dk1"/>
+                </a:solidFill>
+                <a:latin typeface="Calibri"/>
+                <a:ea typeface="Calibri"/>
+                <a:cs typeface="Calibri"/>
+                <a:sym typeface="Calibri"/>
+              </a:rPr>
+              <a:t>:</a:t>
+            </a:r>
+            <a:endParaRPr sz="1700">
+              <a:solidFill>
+                <a:schemeClr val="dk1"/>
+              </a:solidFill>
+              <a:latin typeface="Calibri"/>
+              <a:ea typeface="Calibri"/>
+              <a:cs typeface="Calibri"/>
+              <a:sym typeface="Calibri"/>
+            </a:endParaRPr>
+          </a:p>
+          <a:p>
+            <a:pPr indent="-336550" lvl="0" marL="457200" rtl="0" algn="l">
+              <a:spcBef>
+                <a:spcPts val="0"/>
+              </a:spcBef>
+              <a:spcAft>
+                <a:spcPts val="0"/>
+              </a:spcAft>
+              <a:buClr>
+                <a:schemeClr val="dk1"/>
+              </a:buClr>
+              <a:buSzPts val="1700"/>
+              <a:buFont typeface="Calibri"/>
+              <a:buChar char="●"/>
+            </a:pPr>
+            <a:r>
+              <a:rPr lang="en" sz="1700">
+                <a:solidFill>
+                  <a:schemeClr val="dk1"/>
+                </a:solidFill>
+                <a:latin typeface="Calibri"/>
+                <a:ea typeface="Calibri"/>
+                <a:cs typeface="Calibri"/>
+                <a:sym typeface="Calibri"/>
+              </a:rPr>
+              <a:t>XML readability</a:t>
+            </a:r>
+            <a:endParaRPr sz="1700">
+              <a:solidFill>
+                <a:schemeClr val="dk1"/>
+              </a:solidFill>
+              <a:latin typeface="Calibri"/>
+              <a:ea typeface="Calibri"/>
+              <a:cs typeface="Calibri"/>
+              <a:sym typeface="Calibri"/>
+            </a:endParaRPr>
+          </a:p>
+          <a:p>
+            <a:pPr indent="0" lvl="0" marL="0" rtl="0" algn="l">
+              <a:spcBef>
+                <a:spcPts val="1000"/>
+              </a:spcBef>
+              <a:spcAft>
+                <a:spcPts val="0"/>
+              </a:spcAft>
+              <a:buClr>
+                <a:schemeClr val="dk1"/>
+              </a:buClr>
+              <a:buSzPts val="1100"/>
+              <a:buFont typeface="Arial"/>
+              <a:buNone/>
+            </a:pPr>
+            <a:r>
+              <a:rPr b="1" lang="en" sz="1700">
+                <a:solidFill>
+                  <a:schemeClr val="dk1"/>
+                </a:solidFill>
+                <a:latin typeface="Calibri"/>
+                <a:ea typeface="Calibri"/>
+                <a:cs typeface="Calibri"/>
+                <a:sym typeface="Calibri"/>
+              </a:rPr>
+              <a:t>Arguments against “observed-timestamp”</a:t>
+            </a:r>
+            <a:r>
+              <a:rPr lang="en" sz="1700">
+                <a:solidFill>
+                  <a:schemeClr val="dk1"/>
+                </a:solidFill>
+                <a:latin typeface="Calibri"/>
+                <a:ea typeface="Calibri"/>
+                <a:cs typeface="Calibri"/>
+                <a:sym typeface="Calibri"/>
+              </a:rPr>
+              <a:t>:</a:t>
+            </a:r>
+            <a:endParaRPr sz="1700">
+              <a:solidFill>
+                <a:schemeClr val="dk1"/>
+              </a:solidFill>
+              <a:latin typeface="Calibri"/>
+              <a:ea typeface="Calibri"/>
+              <a:cs typeface="Calibri"/>
+              <a:sym typeface="Calibri"/>
+            </a:endParaRPr>
+          </a:p>
+          <a:p>
+            <a:pPr indent="-336550" lvl="0" marL="457200" rtl="0" algn="l">
+              <a:spcBef>
+                <a:spcPts val="0"/>
+              </a:spcBef>
+              <a:spcAft>
+                <a:spcPts val="0"/>
+              </a:spcAft>
+              <a:buClr>
+                <a:schemeClr val="dk1"/>
+              </a:buClr>
+              <a:buSzPts val="1700"/>
+              <a:buFont typeface="Calibri"/>
+              <a:buChar char="●"/>
+            </a:pPr>
+            <a:r>
+              <a:rPr lang="en" sz="1700" u="sng">
+                <a:solidFill>
+                  <a:schemeClr val="hlink"/>
+                </a:solidFill>
+                <a:latin typeface="Calibri"/>
+                <a:ea typeface="Calibri"/>
+                <a:cs typeface="Calibri"/>
+                <a:sym typeface="Calibri"/>
+                <a:hlinkClick r:id="rId5"/>
+              </a:rPr>
+              <a:t>draft-ietf-netmod-rfc8407bis-28#section-4.3.1</a:t>
+            </a:r>
+            <a:r>
+              <a:rPr lang="en" sz="1700">
+                <a:solidFill>
+                  <a:schemeClr val="dk1"/>
+                </a:solidFill>
+                <a:latin typeface="Calibri"/>
+                <a:ea typeface="Calibri"/>
+                <a:cs typeface="Calibri"/>
+                <a:sym typeface="Calibri"/>
+              </a:rPr>
+              <a:t> states that the name should not be repeated within a container</a:t>
+            </a:r>
+            <a:endParaRPr sz="1700">
+              <a:solidFill>
+                <a:schemeClr val="dk1"/>
+              </a:solidFill>
+              <a:latin typeface="Calibri"/>
+              <a:ea typeface="Calibri"/>
+              <a:cs typeface="Calibri"/>
+              <a:sym typeface="Calibri"/>
+            </a:endParaRPr>
+          </a:p>
+          <a:p>
+            <a:pPr indent="0" lvl="0" marL="0" rtl="0" algn="l">
+              <a:spcBef>
+                <a:spcPts val="1000"/>
+              </a:spcBef>
+              <a:spcAft>
+                <a:spcPts val="0"/>
+              </a:spcAft>
+              <a:buNone/>
+            </a:pPr>
+            <a:r>
+              <a:rPr lang="en" sz="1700">
+                <a:solidFill>
+                  <a:schemeClr val="dk1"/>
+                </a:solidFill>
+                <a:latin typeface="Calibri"/>
+                <a:ea typeface="Calibri"/>
+                <a:cs typeface="Calibri"/>
+                <a:sym typeface="Calibri"/>
+              </a:rPr>
+              <a:t>NETCONF WG:</a:t>
+            </a:r>
+            <a:endParaRPr sz="1700">
+              <a:solidFill>
+                <a:schemeClr val="dk1"/>
+              </a:solidFill>
+              <a:latin typeface="Calibri"/>
+              <a:ea typeface="Calibri"/>
+              <a:cs typeface="Calibri"/>
+              <a:sym typeface="Calibri"/>
+            </a:endParaRPr>
+          </a:p>
+          <a:p>
+            <a:pPr indent="0" lvl="0" marL="0" rtl="0" algn="l">
+              <a:spcBef>
+                <a:spcPts val="0"/>
+              </a:spcBef>
+              <a:spcAft>
+                <a:spcPts val="1000"/>
+              </a:spcAft>
+              <a:buNone/>
+            </a:pPr>
+            <a:r>
+              <a:rPr lang="en" sz="1700">
+                <a:solidFill>
+                  <a:schemeClr val="dk1"/>
+                </a:solidFill>
+                <a:latin typeface="Calibri"/>
+                <a:ea typeface="Calibri"/>
+                <a:cs typeface="Calibri"/>
+                <a:sym typeface="Calibri"/>
+              </a:rPr>
+              <a:t>→ </a:t>
+            </a:r>
+            <a:r>
+              <a:rPr lang="en" sz="1700">
+                <a:solidFill>
+                  <a:srgbClr val="FF0000"/>
+                </a:solidFill>
+                <a:latin typeface="Calibri"/>
+                <a:ea typeface="Calibri"/>
+                <a:cs typeface="Calibri"/>
+                <a:sym typeface="Calibri"/>
+              </a:rPr>
+              <a:t>We request feedback from the WG to close this discussion</a:t>
+            </a:r>
+            <a:endParaRPr sz="1700">
+              <a:solidFill>
+                <a:srgbClr val="FF0000"/>
+              </a:solidFill>
+              <a:latin typeface="Calibri"/>
+              <a:ea typeface="Calibri"/>
+              <a:cs typeface="Calibri"/>
+              <a:sym typeface="Calibri"/>
+            </a:endParaRPr>
+          </a:p>
+        </p:txBody>
+      </p:sp>
+      <p:sp>
+        <p:nvSpPr>
+          <p:cNvPr id="117" name="Google Shape;117;p16"/>
           <p:cNvSpPr/>
           <p:nvPr/>
         </p:nvSpPr>
         <p:spPr>
           <a:xfrm>
-            <a:off x="6850300" y="3424625"/>
+            <a:off x="6850300" y="3203399"/>
             <a:ext cx="2790600" cy="175200"/>
           </a:xfrm>
           <a:prstGeom prst="rect">
@@ -23432,224 +23730,13 @@
       </p:sp>
       <p:sp>
         <p:nvSpPr>
-          <p:cNvPr id="117" name="Google Shape;117;p16"/>
-          <p:cNvSpPr txBox="1"/>
-          <p:nvPr/>
-        </p:nvSpPr>
-        <p:spPr>
-          <a:xfrm>
-            <a:off x="908675" y="4864025"/>
-            <a:ext cx="10287000" cy="1616100"/>
-          </a:xfrm>
-          <a:prstGeom prst="rect">
-            <a:avLst/>
-          </a:prstGeom>
-          <a:noFill/>
-          <a:ln>
-            <a:noFill/>
-          </a:ln>
-        </p:spPr>
-        <p:txBody>
-          <a:bodyPr anchorCtr="0" anchor="t" bIns="91425" lIns="91425" spcFirstLastPara="1" rIns="91425" wrap="square" tIns="91425">
-            <a:spAutoFit/>
-          </a:bodyPr>
-          <a:lstStyle/>
-          <a:p>
-            <a:pPr indent="0" lvl="0" marL="0" rtl="0" algn="l">
-              <a:spcBef>
-                <a:spcPts val="0"/>
-              </a:spcBef>
-              <a:spcAft>
-                <a:spcPts val="0"/>
-              </a:spcAft>
-              <a:buClr>
-                <a:schemeClr val="dk1"/>
-              </a:buClr>
-              <a:buSzPts val="1100"/>
-              <a:buFont typeface="Arial"/>
-              <a:buNone/>
-            </a:pPr>
-            <a:r>
-              <a:rPr b="1" lang="en" sz="1700">
-                <a:solidFill>
-                  <a:schemeClr val="dk1"/>
-                </a:solidFill>
-                <a:latin typeface="Calibri"/>
-                <a:ea typeface="Calibri"/>
-                <a:cs typeface="Calibri"/>
-                <a:sym typeface="Calibri"/>
-              </a:rPr>
-              <a:t>Reasons in favor of “observed-timestamp”</a:t>
-            </a:r>
-            <a:r>
-              <a:rPr lang="en" sz="1700">
-                <a:solidFill>
-                  <a:schemeClr val="dk1"/>
-                </a:solidFill>
-                <a:latin typeface="Calibri"/>
-                <a:ea typeface="Calibri"/>
-                <a:cs typeface="Calibri"/>
-                <a:sym typeface="Calibri"/>
-              </a:rPr>
-              <a:t>:</a:t>
-            </a:r>
-            <a:endParaRPr sz="1700">
-              <a:solidFill>
-                <a:schemeClr val="dk1"/>
-              </a:solidFill>
-              <a:latin typeface="Calibri"/>
-              <a:ea typeface="Calibri"/>
-              <a:cs typeface="Calibri"/>
-              <a:sym typeface="Calibri"/>
-            </a:endParaRPr>
-          </a:p>
-          <a:p>
-            <a:pPr indent="-336550" lvl="0" marL="457200" rtl="0" algn="l">
-              <a:spcBef>
-                <a:spcPts val="1000"/>
-              </a:spcBef>
-              <a:spcAft>
-                <a:spcPts val="0"/>
-              </a:spcAft>
-              <a:buClr>
-                <a:schemeClr val="dk1"/>
-              </a:buClr>
-              <a:buSzPts val="1700"/>
-              <a:buFont typeface="Calibri"/>
-              <a:buChar char="●"/>
-            </a:pPr>
-            <a:r>
-              <a:rPr lang="en" sz="1700">
-                <a:solidFill>
-                  <a:schemeClr val="dk1"/>
-                </a:solidFill>
-                <a:latin typeface="Calibri"/>
-                <a:ea typeface="Calibri"/>
-                <a:cs typeface="Calibri"/>
-                <a:sym typeface="Calibri"/>
-              </a:rPr>
-              <a:t>XML readability</a:t>
-            </a:r>
-            <a:endParaRPr sz="1700">
-              <a:solidFill>
-                <a:schemeClr val="dk1"/>
-              </a:solidFill>
-              <a:latin typeface="Calibri"/>
-              <a:ea typeface="Calibri"/>
-              <a:cs typeface="Calibri"/>
-              <a:sym typeface="Calibri"/>
-            </a:endParaRPr>
-          </a:p>
-          <a:p>
-            <a:pPr indent="0" lvl="0" marL="0" rtl="0" algn="l">
-              <a:spcBef>
-                <a:spcPts val="1000"/>
-              </a:spcBef>
-              <a:spcAft>
-                <a:spcPts val="0"/>
-              </a:spcAft>
-              <a:buClr>
-                <a:schemeClr val="dk1"/>
-              </a:buClr>
-              <a:buSzPts val="1100"/>
-              <a:buFont typeface="Arial"/>
-              <a:buNone/>
-            </a:pPr>
-            <a:r>
-              <a:rPr b="1" lang="en" sz="1700">
-                <a:solidFill>
-                  <a:schemeClr val="dk1"/>
-                </a:solidFill>
-                <a:latin typeface="Calibri"/>
-                <a:ea typeface="Calibri"/>
-                <a:cs typeface="Calibri"/>
-                <a:sym typeface="Calibri"/>
-              </a:rPr>
-              <a:t>Arguments against “observed-timestamp”</a:t>
-            </a:r>
-            <a:r>
-              <a:rPr lang="en" sz="1700">
-                <a:solidFill>
-                  <a:schemeClr val="dk1"/>
-                </a:solidFill>
-                <a:latin typeface="Calibri"/>
-                <a:ea typeface="Calibri"/>
-                <a:cs typeface="Calibri"/>
-                <a:sym typeface="Calibri"/>
-              </a:rPr>
-              <a:t>:</a:t>
-            </a:r>
-            <a:endParaRPr sz="1700">
-              <a:solidFill>
-                <a:schemeClr val="dk1"/>
-              </a:solidFill>
-              <a:latin typeface="Calibri"/>
-              <a:ea typeface="Calibri"/>
-              <a:cs typeface="Calibri"/>
-              <a:sym typeface="Calibri"/>
-            </a:endParaRPr>
-          </a:p>
-          <a:p>
-            <a:pPr indent="-336550" lvl="0" marL="457200" rtl="0" algn="l">
-              <a:spcBef>
-                <a:spcPts val="1000"/>
-              </a:spcBef>
-              <a:spcAft>
-                <a:spcPts val="0"/>
-              </a:spcAft>
-              <a:buClr>
-                <a:schemeClr val="dk1"/>
-              </a:buClr>
-              <a:buSzPts val="1700"/>
-              <a:buFont typeface="Calibri"/>
-              <a:buChar char="●"/>
-            </a:pPr>
-            <a:r>
-              <a:rPr lang="en" sz="1700" u="sng">
-                <a:solidFill>
-                  <a:schemeClr val="hlink"/>
-                </a:solidFill>
-                <a:latin typeface="Calibri"/>
-                <a:ea typeface="Calibri"/>
-                <a:cs typeface="Calibri"/>
-                <a:sym typeface="Calibri"/>
-                <a:hlinkClick r:id="rId5"/>
-              </a:rPr>
-              <a:t>draft-ietf-netmod-rfc8407bis-28#section-4.3.1</a:t>
-            </a:r>
-            <a:r>
-              <a:rPr lang="en" sz="1700">
-                <a:solidFill>
-                  <a:schemeClr val="dk1"/>
-                </a:solidFill>
-                <a:latin typeface="Calibri"/>
-                <a:ea typeface="Calibri"/>
-                <a:cs typeface="Calibri"/>
-                <a:sym typeface="Calibri"/>
-              </a:rPr>
-              <a:t> states that the name should not be repeated within a container</a:t>
-            </a:r>
-            <a:endParaRPr sz="2800">
-              <a:solidFill>
-                <a:schemeClr val="dk1"/>
-              </a:solidFill>
-              <a:latin typeface="Calibri"/>
-              <a:ea typeface="Calibri"/>
-              <a:cs typeface="Calibri"/>
-              <a:sym typeface="Calibri"/>
-            </a:endParaRPr>
-          </a:p>
-        </p:txBody>
-      </p:sp>
-      <p:sp>
-        <p:nvSpPr>
           <p:cNvPr id="118" name="Google Shape;118;p16"/>
           <p:cNvSpPr txBox="1"/>
           <p:nvPr/>
         </p:nvSpPr>
         <p:spPr>
           <a:xfrm>
-            <a:off x="1559813" y="4318000"/>
+            <a:off x="1559813" y="4096774"/>
             <a:ext cx="3360300" cy="384900"/>
           </a:xfrm>
           <a:prstGeom prst="rect">
@@ -23707,7 +23794,7 @@
         </p:nvSpPr>
         <p:spPr>
           <a:xfrm>
-            <a:off x="7200488" y="4300225"/>
+            <a:off x="7200488" y="4078999"/>
             <a:ext cx="3360300" cy="384900"/>
           </a:xfrm>
           <a:prstGeom prst="rect">
@@ -23791,7 +23878,7 @@
         <p:spPr>
           <a:xfrm>
             <a:off x="838200" y="1522975"/>
-            <a:ext cx="10155000" cy="2067600"/>
+            <a:ext cx="10155000" cy="4884600"/>
           </a:xfrm>
           <a:prstGeom prst="rect">
             <a:avLst/>
@@ -23923,7 +24010,7 @@
                 <a:spcPts val="0"/>
               </a:spcBef>
               <a:spcAft>
-                <a:spcPts val="1000"/>
+                <a:spcPts val="0"/>
               </a:spcAft>
               <a:buClr>
                 <a:schemeClr val="dk1"/>
@@ -23942,7 +24029,31 @@
                 <a:cs typeface="Calibri"/>
                 <a:sym typeface="Calibri"/>
               </a:rPr>
-              <a:t>Enable toggling </a:t>
+              <a:t>Enable </a:t>
+            </a:r>
+            <a:r>
+              <a:rPr i="1" lang="en" sz="1900">
+                <a:solidFill>
+                  <a:schemeClr val="dk1"/>
+                </a:solidFill>
+                <a:latin typeface="Calibri"/>
+                <a:ea typeface="Calibri"/>
+                <a:cs typeface="Calibri"/>
+                <a:sym typeface="Calibri"/>
+              </a:rPr>
+              <a:t>toggling</a:t>
+            </a:r>
+            <a:r>
+              <a:rPr lang="en" sz="1900">
+                <a:solidFill>
+                  <a:schemeClr val="dk1"/>
+                </a:solidFill>
+                <a:latin typeface="Calibri"/>
+                <a:ea typeface="Calibri"/>
+                <a:cs typeface="Calibri"/>
+                <a:sym typeface="Calibri"/>
+              </a:rPr>
+              <a:t> </a:t>
             </a:r>
             <a:r>
               <a:rPr lang="en" sz="1900">
@@ -23983,6 +24094,197 @@
             <a:endParaRPr sz="1900">
               <a:solidFill>
                 <a:schemeClr val="dk1"/>
+              </a:solidFill>
+              <a:latin typeface="Calibri"/>
+              <a:ea typeface="Calibri"/>
+              <a:cs typeface="Calibri"/>
+              <a:sym typeface="Calibri"/>
+            </a:endParaRPr>
+          </a:p>
+          <a:p>
+            <a:pPr indent="0" lvl="0" marL="0" rtl="0" algn="l">
+              <a:spcBef>
+                <a:spcPts val="1000"/>
+              </a:spcBef>
+              <a:spcAft>
+                <a:spcPts val="0"/>
+              </a:spcAft>
+              <a:buNone/>
+            </a:pPr>
+            <a:r>
+              <a:t/>
+            </a:r>
+            <a:endParaRPr sz="1900">
+              <a:solidFill>
+                <a:schemeClr val="dk1"/>
+              </a:solidFill>
+              <a:latin typeface="Calibri"/>
+              <a:ea typeface="Calibri"/>
+              <a:cs typeface="Calibri"/>
+              <a:sym typeface="Calibri"/>
+            </a:endParaRPr>
+          </a:p>
+          <a:p>
+            <a:pPr indent="0" lvl="0" marL="0" rtl="0" algn="l">
+              <a:spcBef>
+                <a:spcPts val="1000"/>
+              </a:spcBef>
+              <a:spcAft>
+                <a:spcPts val="0"/>
+              </a:spcAft>
+              <a:buNone/>
+            </a:pPr>
+            <a:r>
+              <a:t/>
+            </a:r>
+            <a:endParaRPr sz="1900">
+              <a:solidFill>
+                <a:schemeClr val="dk1"/>
+              </a:solidFill>
+              <a:latin typeface="Calibri"/>
+              <a:ea typeface="Calibri"/>
+              <a:cs typeface="Calibri"/>
+              <a:sym typeface="Calibri"/>
+            </a:endParaRPr>
+          </a:p>
+          <a:p>
+            <a:pPr indent="0" lvl="0" marL="0" rtl="0" algn="l">
+              <a:spcBef>
+                <a:spcPts val="1000"/>
+              </a:spcBef>
+              <a:spcAft>
+                <a:spcPts val="0"/>
+              </a:spcAft>
+              <a:buNone/>
+            </a:pPr>
+            <a:r>
+              <a:t/>
+            </a:r>
+            <a:endParaRPr sz="1900">
+              <a:solidFill>
+                <a:schemeClr val="dk1"/>
+              </a:solidFill>
+              <a:latin typeface="Calibri"/>
+              <a:ea typeface="Calibri"/>
+              <a:cs typeface="Calibri"/>
+              <a:sym typeface="Calibri"/>
+            </a:endParaRPr>
+          </a:p>
+          <a:p>
+            <a:pPr indent="0" lvl="0" marL="0" rtl="0" algn="l">
+              <a:spcBef>
+                <a:spcPts val="1000"/>
+              </a:spcBef>
+              <a:spcAft>
+                <a:spcPts val="0"/>
+              </a:spcAft>
+              <a:buNone/>
+            </a:pPr>
+            <a:r>
+              <a:t/>
+            </a:r>
+            <a:endParaRPr sz="1900">
+              <a:solidFill>
+                <a:schemeClr val="dk1"/>
+              </a:solidFill>
+              <a:latin typeface="Calibri"/>
+              <a:ea typeface="Calibri"/>
+              <a:cs typeface="Calibri"/>
+              <a:sym typeface="Calibri"/>
+            </a:endParaRPr>
+          </a:p>
+          <a:p>
+            <a:pPr indent="0" lvl="0" marL="0" rtl="0" algn="l">
+              <a:spcBef>
+                <a:spcPts val="1000"/>
+              </a:spcBef>
+              <a:spcAft>
+                <a:spcPts val="0"/>
+              </a:spcAft>
+              <a:buNone/>
+            </a:pPr>
+            <a:r>
+              <a:t/>
+            </a:r>
+            <a:endParaRPr sz="1900">
+              <a:solidFill>
+                <a:schemeClr val="dk1"/>
+              </a:solidFill>
+              <a:latin typeface="Calibri"/>
+              <a:ea typeface="Calibri"/>
+              <a:cs typeface="Calibri"/>
+              <a:sym typeface="Calibri"/>
+            </a:endParaRPr>
+          </a:p>
+          <a:p>
+            <a:pPr indent="0" lvl="0" marL="0" rtl="0" algn="l">
+              <a:spcBef>
+                <a:spcPts val="1000"/>
+              </a:spcBef>
+              <a:spcAft>
+                <a:spcPts val="0"/>
+              </a:spcAft>
+              <a:buNone/>
+            </a:pPr>
+            <a:r>
+              <a:rPr lang="en" sz="1900">
+                <a:solidFill>
+                  <a:schemeClr val="dk1"/>
+                </a:solidFill>
+                <a:latin typeface="Calibri"/>
+                <a:ea typeface="Calibri"/>
+                <a:cs typeface="Calibri"/>
+                <a:sym typeface="Calibri"/>
+              </a:rPr>
+              <a:t>NETCONF WG:</a:t>
+            </a:r>
+            <a:endParaRPr sz="1900">
+              <a:solidFill>
+                <a:schemeClr val="dk1"/>
+              </a:solidFill>
+              <a:latin typeface="Calibri"/>
+              <a:ea typeface="Calibri"/>
+              <a:cs typeface="Calibri"/>
+              <a:sym typeface="Calibri"/>
+            </a:endParaRPr>
+          </a:p>
+          <a:p>
+            <a:pPr indent="0" lvl="0" marL="0" rtl="0" algn="l">
+              <a:spcBef>
+                <a:spcPts val="0"/>
+              </a:spcBef>
+              <a:spcAft>
+                <a:spcPts val="1000"/>
+              </a:spcAft>
+              <a:buNone/>
+            </a:pPr>
+            <a:r>
+              <a:rPr lang="en" sz="1900">
+                <a:solidFill>
+                  <a:schemeClr val="dk1"/>
+                </a:solidFill>
+                <a:latin typeface="Calibri"/>
+                <a:ea typeface="Calibri"/>
+                <a:cs typeface="Calibri"/>
+                <a:sym typeface="Calibri"/>
+              </a:rPr>
+              <a:t>→ </a:t>
+            </a:r>
+            <a:r>
+              <a:rPr lang="en" sz="1900">
+                <a:solidFill>
+                  <a:srgbClr val="FF0000"/>
+                </a:solidFill>
+                <a:latin typeface="Calibri"/>
+                <a:ea typeface="Calibri"/>
+                <a:cs typeface="Calibri"/>
+                <a:sym typeface="Calibri"/>
+              </a:rPr>
+              <a:t>We request feedback from the WG to close this discussion. Any objections?</a:t>
+            </a:r>
+            <a:endParaRPr sz="1900">
+              <a:solidFill>
+                <a:srgbClr val="FF0000"/>
               </a:solidFill>
               <a:latin typeface="Calibri"/>
               <a:ea typeface="Calibri"/>
@@ -24127,7 +24429,7 @@
         </p:blipFill>
         <p:spPr>
           <a:xfrm>
-            <a:off x="3256625" y="3810750"/>
+            <a:off x="3256625" y="3580675"/>
             <a:ext cx="5678752" cy="1700225"/>
           </a:xfrm>
           <a:prstGeom prst="rect">
@@ -24147,7 +24449,7 @@
         </p:nvSpPr>
         <p:spPr>
           <a:xfrm>
-            <a:off x="3547500" y="5510975"/>
+            <a:off x="3547500" y="5280900"/>
             <a:ext cx="5097000" cy="415500"/>
           </a:xfrm>
           <a:prstGeom prst="rect">
@@ -24342,7 +24644,19 @@
                 <a:cs typeface="Calibri"/>
                 <a:sym typeface="Calibri"/>
               </a:rPr>
-              <a:t>OPSDIR review</a:t>
+              <a:t>Submit -04 iteration integrating </a:t>
+            </a:r>
+            <a:r>
+              <a:rPr lang="en" sz="1900">
+                <a:solidFill>
+                  <a:schemeClr val="dk1"/>
+                </a:solidFill>
+                <a:latin typeface="Calibri"/>
+                <a:ea typeface="Calibri"/>
+                <a:cs typeface="Calibri"/>
+                <a:sym typeface="Calibri"/>
+              </a:rPr>
+              <a:t>OPSDIR review and last changes</a:t>
             </a:r>
             <a:endParaRPr sz="1900">
               <a:solidFill>

</xml_diff>